<commit_message>
Added source links to 1st page of slide decks
</commit_message>
<xml_diff>
--- a/ppt/ACC2016 Xamarin pt1.pptx
+++ b/ppt/ACC2016 Xamarin pt1.pptx
@@ -215,7 +215,7 @@
           <a:p>
             <a:fld id="{D21D5D59-70AD-4881-B086-0E64D7C257F4}" type="datetimeFigureOut">
               <a:rPr lang="en-US"/>
-              <a:t>10/14/16</a:t>
+              <a:t>10/15/16</a:t>
             </a:fld>
             <a:endParaRPr lang="en-US"/>
           </a:p>
@@ -3004,7 +3004,7 @@
           <a:p>
             <a:fld id="{96DFF08F-DC6B-4601-B491-B0F83F6DD2DA}" type="datetimeFigureOut">
               <a:rPr lang="en-US" dirty="0"/>
-              <a:t>10/14/16</a:t>
+              <a:t>10/15/16</a:t>
             </a:fld>
             <a:endParaRPr lang="en-US"/>
           </a:p>
@@ -3205,7 +3205,7 @@
           <a:p>
             <a:fld id="{96DFF08F-DC6B-4601-B491-B0F83F6DD2DA}" type="datetimeFigureOut">
               <a:rPr lang="en-US" dirty="0"/>
-              <a:t>10/14/16</a:t>
+              <a:t>10/15/16</a:t>
             </a:fld>
             <a:endParaRPr lang="en-US"/>
           </a:p>
@@ -3454,7 +3454,7 @@
           <a:p>
             <a:fld id="{96DFF08F-DC6B-4601-B491-B0F83F6DD2DA}" type="datetimeFigureOut">
               <a:rPr lang="en-US" dirty="0"/>
-              <a:t>10/14/16</a:t>
+              <a:t>10/15/16</a:t>
             </a:fld>
             <a:endParaRPr lang="en-US"/>
           </a:p>
@@ -3617,7 +3617,7 @@
           <a:p>
             <a:fld id="{D62CEF3B-A037-46D0-B02C-1428F07E9383}" type="datetimeFigureOut">
               <a:rPr lang="en-US" dirty="0"/>
-              <a:t>10/14/16</a:t>
+              <a:t>10/15/16</a:t>
             </a:fld>
             <a:endParaRPr lang="en-US"/>
           </a:p>
@@ -3954,7 +3954,7 @@
           <a:p>
             <a:fld id="{96DFF08F-DC6B-4601-B491-B0F83F6DD2DA}" type="datetimeFigureOut">
               <a:rPr lang="en-US" dirty="0"/>
-              <a:t>10/14/16</a:t>
+              <a:t>10/15/16</a:t>
             </a:fld>
             <a:endParaRPr lang="en-US"/>
           </a:p>
@@ -4221,7 +4221,7 @@
           <a:p>
             <a:fld id="{96DFF08F-DC6B-4601-B491-B0F83F6DD2DA}" type="datetimeFigureOut">
               <a:rPr lang="en-US" dirty="0"/>
-              <a:t>10/14/16</a:t>
+              <a:t>10/15/16</a:t>
             </a:fld>
             <a:endParaRPr lang="en-US"/>
           </a:p>
@@ -4592,7 +4592,7 @@
           <a:p>
             <a:fld id="{96DFF08F-DC6B-4601-B491-B0F83F6DD2DA}" type="datetimeFigureOut">
               <a:rPr lang="en-US" dirty="0"/>
-              <a:t>10/14/16</a:t>
+              <a:t>10/15/16</a:t>
             </a:fld>
             <a:endParaRPr lang="en-US"/>
           </a:p>
@@ -4704,7 +4704,7 @@
           <a:p>
             <a:fld id="{96DFF08F-DC6B-4601-B491-B0F83F6DD2DA}" type="datetimeFigureOut">
               <a:rPr lang="en-US" dirty="0"/>
-              <a:t>10/14/16</a:t>
+              <a:t>10/15/16</a:t>
             </a:fld>
             <a:endParaRPr lang="en-US"/>
           </a:p>
@@ -4871,7 +4871,7 @@
             <a:fld id="{96DFF08F-DC6B-4601-B491-B0F83F6DD2DA}" type="datetimeFigureOut">
               <a:rPr lang="en-US" dirty="0"/>
               <a:pPr/>
-              <a:t>10/14/16</a:t>
+              <a:t>10/15/16</a:t>
             </a:fld>
             <a:endParaRPr lang="en-US"/>
           </a:p>
@@ -5220,7 +5220,7 @@
             <a:fld id="{96DFF08F-DC6B-4601-B491-B0F83F6DD2DA}" type="datetimeFigureOut">
               <a:rPr lang="en-US" dirty="0"/>
               <a:pPr/>
-              <a:t>10/14/16</a:t>
+              <a:t>10/15/16</a:t>
             </a:fld>
             <a:endParaRPr lang="en-US"/>
           </a:p>
@@ -5591,7 +5591,7 @@
           <a:p>
             <a:fld id="{96DFF08F-DC6B-4601-B491-B0F83F6DD2DA}" type="datetimeFigureOut">
               <a:rPr lang="en-US" dirty="0"/>
-              <a:t>10/14/16</a:t>
+              <a:t>10/15/16</a:t>
             </a:fld>
             <a:endParaRPr lang="en-US"/>
           </a:p>
@@ -5872,7 +5872,7 @@
             <a:fld id="{96DFF08F-DC6B-4601-B491-B0F83F6DD2DA}" type="datetimeFigureOut">
               <a:rPr lang="en-US" dirty="0"/>
               <a:pPr/>
-              <a:t>10/14/16</a:t>
+              <a:t>10/15/16</a:t>
             </a:fld>
             <a:endParaRPr lang="en-US"/>
           </a:p>
@@ -6552,6 +6552,65 @@
           </a:prstGeom>
         </p:spPr>
       </p:pic>
+      <p:sp>
+        <p:nvSpPr>
+          <p:cNvPr id="2" name="TextBox 1"/>
+          <p:cNvSpPr txBox="1"/>
+          <p:nvPr/>
+        </p:nvSpPr>
+        <p:spPr>
+          <a:xfrm>
+            <a:off x="1097279" y="628444"/>
+            <a:ext cx="6475095" cy="830997"/>
+          </a:xfrm>
+          <a:prstGeom prst="rect">
+            <a:avLst/>
+          </a:prstGeom>
+          <a:solidFill>
+            <a:schemeClr val="bg1">
+              <a:lumMod val="95000"/>
+            </a:schemeClr>
+          </a:solidFill>
+          <a:ln>
+            <a:solidFill>
+              <a:schemeClr val="bg1">
+                <a:lumMod val="75000"/>
+              </a:schemeClr>
+            </a:solidFill>
+          </a:ln>
+        </p:spPr>
+        <p:txBody>
+          <a:bodyPr wrap="square" rtlCol="0">
+            <a:spAutoFit/>
+          </a:bodyPr>
+          <a:lstStyle/>
+          <a:p>
+            <a:r>
+              <a:rPr lang="en-US" sz="2400" b="1" dirty="0" smtClean="0"/>
+              <a:t>Slides and Code online here:</a:t>
+            </a:r>
+          </a:p>
+          <a:p>
+            <a:r>
+              <a:rPr lang="en-US" sz="2400" b="1" dirty="0">
+                <a:hlinkClick r:id="rId6"/>
+              </a:rPr>
+              <a:t>https://</a:t>
+            </a:r>
+            <a:r>
+              <a:rPr lang="en-US" sz="2400" b="1" dirty="0" smtClean="0">
+                <a:hlinkClick r:id="rId6"/>
+              </a:rPr>
+              <a:t>github.com/KeithJRome/MagicEightBall</a:t>
+            </a:r>
+            <a:r>
+              <a:rPr lang="en-US" sz="2400" b="1" dirty="0" smtClean="0"/>
+              <a:t> </a:t>
+            </a:r>
+            <a:endParaRPr lang="en-US" sz="2400" b="1" dirty="0"/>
+          </a:p>
+        </p:txBody>
+      </p:sp>
     </p:spTree>
     <p:extLst>
       <p:ext uri="{BB962C8B-B14F-4D97-AF65-F5344CB8AC3E}">
@@ -7294,7 +7353,6 @@
               <a:rPr lang="en-US" cap="none" dirty="0" smtClean="0"/>
               <a:t> Emulators (not free)</a:t>
             </a:r>
-            <a:endParaRPr lang="en-US" cap="none" dirty="0" smtClean="0"/>
           </a:p>
         </p:txBody>
       </p:sp>
@@ -8346,7 +8404,6 @@
               <a:rPr lang="en-US" cap="none" dirty="0" smtClean="0"/>
               <a:t>Demo Time!</a:t>
             </a:r>
-            <a:endParaRPr lang="en-US" cap="none" dirty="0" smtClean="0"/>
           </a:p>
         </p:txBody>
       </p:sp>
@@ -12045,11 +12102,6 @@
               </a:rPr>
               <a:t> of these options have scenarios where they outperform the others</a:t>
             </a:r>
-            <a:endParaRPr lang="en-US" cap="none" dirty="0" smtClean="0">
-              <a:solidFill>
-                <a:srgbClr val="FF0000"/>
-              </a:solidFill>
-            </a:endParaRPr>
           </a:p>
         </p:txBody>
       </p:sp>
@@ -13319,7 +13371,6 @@
               <a:rPr lang="en-US" dirty="0" smtClean="0"/>
               <a:t>Xamarin Forms provides a simpler abstraction on top of Classic, targeting both at the same time</a:t>
             </a:r>
-            <a:endParaRPr lang="en-US" dirty="0" smtClean="0"/>
           </a:p>
         </p:txBody>
       </p:sp>

</xml_diff>